<commit_message>
Some additions, but not new data yet
</commit_message>
<xml_diff>
--- a/figures/figures.pptx
+++ b/figures/figures.pptx
@@ -197,7 +197,7 @@
           <a:p>
             <a:fld id="{83C39EC2-D90B-2940-988C-6CDB91F4750A}" type="datetimeFigureOut">
               <a:rPr lang="en-US" smtClean="0"/>
-              <a:t>11/4/19</a:t>
+              <a:t>11/22/19</a:t>
             </a:fld>
             <a:endParaRPr lang="en-US"/>
           </a:p>
@@ -702,7 +702,7 @@
           <a:p>
             <a:fld id="{A119A81C-44B9-D145-99DB-7EC8F4ADF9B2}" type="datetimeFigureOut">
               <a:rPr lang="en-US" smtClean="0"/>
-              <a:t>11/4/19</a:t>
+              <a:t>11/22/19</a:t>
             </a:fld>
             <a:endParaRPr lang="en-US"/>
           </a:p>
@@ -900,7 +900,7 @@
           <a:p>
             <a:fld id="{A119A81C-44B9-D145-99DB-7EC8F4ADF9B2}" type="datetimeFigureOut">
               <a:rPr lang="en-US" smtClean="0"/>
-              <a:t>11/4/19</a:t>
+              <a:t>11/22/19</a:t>
             </a:fld>
             <a:endParaRPr lang="en-US"/>
           </a:p>
@@ -1108,7 +1108,7 @@
           <a:p>
             <a:fld id="{A119A81C-44B9-D145-99DB-7EC8F4ADF9B2}" type="datetimeFigureOut">
               <a:rPr lang="en-US" smtClean="0"/>
-              <a:t>11/4/19</a:t>
+              <a:t>11/22/19</a:t>
             </a:fld>
             <a:endParaRPr lang="en-US"/>
           </a:p>
@@ -1306,7 +1306,7 @@
           <a:p>
             <a:fld id="{A119A81C-44B9-D145-99DB-7EC8F4ADF9B2}" type="datetimeFigureOut">
               <a:rPr lang="en-US" smtClean="0"/>
-              <a:t>11/4/19</a:t>
+              <a:t>11/22/19</a:t>
             </a:fld>
             <a:endParaRPr lang="en-US"/>
           </a:p>
@@ -1581,7 +1581,7 @@
           <a:p>
             <a:fld id="{A119A81C-44B9-D145-99DB-7EC8F4ADF9B2}" type="datetimeFigureOut">
               <a:rPr lang="en-US" smtClean="0"/>
-              <a:t>11/4/19</a:t>
+              <a:t>11/22/19</a:t>
             </a:fld>
             <a:endParaRPr lang="en-US"/>
           </a:p>
@@ -1846,7 +1846,7 @@
           <a:p>
             <a:fld id="{A119A81C-44B9-D145-99DB-7EC8F4ADF9B2}" type="datetimeFigureOut">
               <a:rPr lang="en-US" smtClean="0"/>
-              <a:t>11/4/19</a:t>
+              <a:t>11/22/19</a:t>
             </a:fld>
             <a:endParaRPr lang="en-US"/>
           </a:p>
@@ -2258,7 +2258,7 @@
           <a:p>
             <a:fld id="{A119A81C-44B9-D145-99DB-7EC8F4ADF9B2}" type="datetimeFigureOut">
               <a:rPr lang="en-US" smtClean="0"/>
-              <a:t>11/4/19</a:t>
+              <a:t>11/22/19</a:t>
             </a:fld>
             <a:endParaRPr lang="en-US"/>
           </a:p>
@@ -2399,7 +2399,7 @@
           <a:p>
             <a:fld id="{A119A81C-44B9-D145-99DB-7EC8F4ADF9B2}" type="datetimeFigureOut">
               <a:rPr lang="en-US" smtClean="0"/>
-              <a:t>11/4/19</a:t>
+              <a:t>11/22/19</a:t>
             </a:fld>
             <a:endParaRPr lang="en-US"/>
           </a:p>
@@ -2512,7 +2512,7 @@
           <a:p>
             <a:fld id="{A119A81C-44B9-D145-99DB-7EC8F4ADF9B2}" type="datetimeFigureOut">
               <a:rPr lang="en-US" smtClean="0"/>
-              <a:t>11/4/19</a:t>
+              <a:t>11/22/19</a:t>
             </a:fld>
             <a:endParaRPr lang="en-US"/>
           </a:p>
@@ -2823,7 +2823,7 @@
           <a:p>
             <a:fld id="{A119A81C-44B9-D145-99DB-7EC8F4ADF9B2}" type="datetimeFigureOut">
               <a:rPr lang="en-US" smtClean="0"/>
-              <a:t>11/4/19</a:t>
+              <a:t>11/22/19</a:t>
             </a:fld>
             <a:endParaRPr lang="en-US"/>
           </a:p>
@@ -3111,7 +3111,7 @@
           <a:p>
             <a:fld id="{A119A81C-44B9-D145-99DB-7EC8F4ADF9B2}" type="datetimeFigureOut">
               <a:rPr lang="en-US" smtClean="0"/>
-              <a:t>11/4/19</a:t>
+              <a:t>11/22/19</a:t>
             </a:fld>
             <a:endParaRPr lang="en-US"/>
           </a:p>
@@ -3352,7 +3352,7 @@
           <a:p>
             <a:fld id="{A119A81C-44B9-D145-99DB-7EC8F4ADF9B2}" type="datetimeFigureOut">
               <a:rPr lang="en-US" smtClean="0"/>
-              <a:t>11/4/19</a:t>
+              <a:t>11/22/19</a:t>
             </a:fld>
             <a:endParaRPr lang="en-US"/>
           </a:p>
@@ -4031,8 +4031,8 @@
         </p:nvSpPr>
         <p:spPr>
           <a:xfrm>
-            <a:off x="296556" y="617112"/>
-            <a:ext cx="798616" cy="584775"/>
+            <a:off x="96984" y="617112"/>
+            <a:ext cx="1197764" cy="584775"/>
           </a:xfrm>
           <a:prstGeom prst="rect">
             <a:avLst/>
@@ -4050,7 +4050,7 @@
               <a:rPr lang="en-US" sz="1600" dirty="0">
                 <a:latin typeface="Helvetica" pitchFamily="2" charset="0"/>
               </a:rPr>
-              <a:t>Failed </a:t>
+              <a:t>Input</a:t>
             </a:r>
             <a:br>
               <a:rPr lang="en-US" sz="1600" dirty="0">
@@ -4061,7 +4061,7 @@
               <a:rPr lang="en-US" sz="1600" dirty="0">
                 <a:latin typeface="Helvetica" pitchFamily="2" charset="0"/>
               </a:rPr>
-              <a:t>Proofs</a:t>
+              <a:t>Expression</a:t>
             </a:r>
           </a:p>
         </p:txBody>

</xml_diff>